<commit_message>
add lr svr and cnn
</commit_message>
<xml_diff>
--- a/Project.pptx
+++ b/Project.pptx
@@ -11,7 +11,8 @@
     <p:sldId id="258" r:id="rId5"/>
     <p:sldId id="260" r:id="rId6"/>
     <p:sldId id="262" r:id="rId7"/>
-    <p:sldId id="261" r:id="rId8"/>
+    <p:sldId id="264" r:id="rId8"/>
+    <p:sldId id="261" r:id="rId9"/>
   </p:sldIdLst>
   <p:sldSz cx="12192000" cy="6858000"/>
   <p:notesSz cx="6858000" cy="9144000"/>
@@ -265,7 +266,7 @@
           <a:p>
             <a:fld id="{EB018F8A-0163-4A99-8971-4E2B9D3D4C78}" type="datetimeFigureOut">
               <a:rPr lang="zh-CN" altLang="en-US" smtClean="0"/>
-              <a:t>2023/12/30</a:t>
+              <a:t>2024/1/7</a:t>
             </a:fld>
             <a:endParaRPr lang="zh-CN" altLang="en-US"/>
           </a:p>
@@ -463,7 +464,7 @@
           <a:p>
             <a:fld id="{EB018F8A-0163-4A99-8971-4E2B9D3D4C78}" type="datetimeFigureOut">
               <a:rPr lang="zh-CN" altLang="en-US" smtClean="0"/>
-              <a:t>2023/12/30</a:t>
+              <a:t>2024/1/7</a:t>
             </a:fld>
             <a:endParaRPr lang="zh-CN" altLang="en-US"/>
           </a:p>
@@ -671,7 +672,7 @@
           <a:p>
             <a:fld id="{EB018F8A-0163-4A99-8971-4E2B9D3D4C78}" type="datetimeFigureOut">
               <a:rPr lang="zh-CN" altLang="en-US" smtClean="0"/>
-              <a:t>2023/12/30</a:t>
+              <a:t>2024/1/7</a:t>
             </a:fld>
             <a:endParaRPr lang="zh-CN" altLang="en-US"/>
           </a:p>
@@ -869,7 +870,7 @@
           <a:p>
             <a:fld id="{EB018F8A-0163-4A99-8971-4E2B9D3D4C78}" type="datetimeFigureOut">
               <a:rPr lang="zh-CN" altLang="en-US" smtClean="0"/>
-              <a:t>2023/12/30</a:t>
+              <a:t>2024/1/7</a:t>
             </a:fld>
             <a:endParaRPr lang="zh-CN" altLang="en-US"/>
           </a:p>
@@ -1144,7 +1145,7 @@
           <a:p>
             <a:fld id="{EB018F8A-0163-4A99-8971-4E2B9D3D4C78}" type="datetimeFigureOut">
               <a:rPr lang="zh-CN" altLang="en-US" smtClean="0"/>
-              <a:t>2023/12/30</a:t>
+              <a:t>2024/1/7</a:t>
             </a:fld>
             <a:endParaRPr lang="zh-CN" altLang="en-US"/>
           </a:p>
@@ -1409,7 +1410,7 @@
           <a:p>
             <a:fld id="{EB018F8A-0163-4A99-8971-4E2B9D3D4C78}" type="datetimeFigureOut">
               <a:rPr lang="zh-CN" altLang="en-US" smtClean="0"/>
-              <a:t>2023/12/30</a:t>
+              <a:t>2024/1/7</a:t>
             </a:fld>
             <a:endParaRPr lang="zh-CN" altLang="en-US"/>
           </a:p>
@@ -1821,7 +1822,7 @@
           <a:p>
             <a:fld id="{EB018F8A-0163-4A99-8971-4E2B9D3D4C78}" type="datetimeFigureOut">
               <a:rPr lang="zh-CN" altLang="en-US" smtClean="0"/>
-              <a:t>2023/12/30</a:t>
+              <a:t>2024/1/7</a:t>
             </a:fld>
             <a:endParaRPr lang="zh-CN" altLang="en-US"/>
           </a:p>
@@ -1962,7 +1963,7 @@
           <a:p>
             <a:fld id="{EB018F8A-0163-4A99-8971-4E2B9D3D4C78}" type="datetimeFigureOut">
               <a:rPr lang="zh-CN" altLang="en-US" smtClean="0"/>
-              <a:t>2023/12/30</a:t>
+              <a:t>2024/1/7</a:t>
             </a:fld>
             <a:endParaRPr lang="zh-CN" altLang="en-US"/>
           </a:p>
@@ -2075,7 +2076,7 @@
           <a:p>
             <a:fld id="{EB018F8A-0163-4A99-8971-4E2B9D3D4C78}" type="datetimeFigureOut">
               <a:rPr lang="zh-CN" altLang="en-US" smtClean="0"/>
-              <a:t>2023/12/30</a:t>
+              <a:t>2024/1/7</a:t>
             </a:fld>
             <a:endParaRPr lang="zh-CN" altLang="en-US"/>
           </a:p>
@@ -2386,7 +2387,7 @@
           <a:p>
             <a:fld id="{EB018F8A-0163-4A99-8971-4E2B9D3D4C78}" type="datetimeFigureOut">
               <a:rPr lang="zh-CN" altLang="en-US" smtClean="0"/>
-              <a:t>2023/12/30</a:t>
+              <a:t>2024/1/7</a:t>
             </a:fld>
             <a:endParaRPr lang="zh-CN" altLang="en-US"/>
           </a:p>
@@ -2674,7 +2675,7 @@
           <a:p>
             <a:fld id="{EB018F8A-0163-4A99-8971-4E2B9D3D4C78}" type="datetimeFigureOut">
               <a:rPr lang="zh-CN" altLang="en-US" smtClean="0"/>
-              <a:t>2023/12/30</a:t>
+              <a:t>2024/1/7</a:t>
             </a:fld>
             <a:endParaRPr lang="zh-CN" altLang="en-US"/>
           </a:p>
@@ -2915,7 +2916,7 @@
           <a:p>
             <a:fld id="{EB018F8A-0163-4A99-8971-4E2B9D3D4C78}" type="datetimeFigureOut">
               <a:rPr lang="zh-CN" altLang="en-US" smtClean="0"/>
-              <a:t>2023/12/30</a:t>
+              <a:t>2024/1/7</a:t>
             </a:fld>
             <a:endParaRPr lang="zh-CN" altLang="en-US"/>
           </a:p>
@@ -5534,6 +5535,14 @@
 <file path=ppt/slides/slide7.xml><?xml version="1.0" encoding="utf-8"?>
 <p:sld xmlns:a="http://schemas.openxmlformats.org/drawingml/2006/main" xmlns:r="http://schemas.openxmlformats.org/officeDocument/2006/relationships" xmlns:p="http://schemas.openxmlformats.org/presentationml/2006/main">
   <p:cSld>
+    <p:bg>
+      <p:bgPr>
+        <a:solidFill>
+          <a:schemeClr val="bg1"/>
+        </a:solidFill>
+        <a:effectLst/>
+      </p:bgPr>
+    </p:bg>
     <p:spTree>
       <p:nvGrpSpPr>
         <p:cNvPr id="1" name=""/>
@@ -5550,6 +5559,401 @@
       </p:grpSpPr>
       <p:sp>
         <p:nvSpPr>
+          <p:cNvPr id="8" name="Rectangle 7">
+            <a:extLst>
+              <a:ext uri="{FF2B5EF4-FFF2-40B4-BE49-F238E27FC236}">
+                <a16:creationId xmlns:a16="http://schemas.microsoft.com/office/drawing/2014/main" id="{B34F5AD2-EDBD-4BBD-A55C-EAFFD0C7097A}"/>
+              </a:ext>
+              <a:ext uri="{C183D7F6-B498-43B3-948B-1728B52AA6E4}">
+                <adec:decorative xmlns:adec="http://schemas.microsoft.com/office/drawing/2017/decorative" val="1"/>
+              </a:ext>
+            </a:extLst>
+          </p:cNvPr>
+          <p:cNvSpPr>
+            <a:spLocks noGrp="1" noRot="1" noChangeAspect="1" noMove="1" noResize="1" noEditPoints="1" noAdjustHandles="1" noChangeArrowheads="1" noChangeShapeType="1" noTextEdit="1"/>
+          </p:cNvSpPr>
+          <p:nvPr>
+            <p:extLst>
+              <p:ext uri="{386F3935-93C4-4BCD-93E2-E3B085C9AB24}">
+                <p16:designElem xmlns:p16="http://schemas.microsoft.com/office/powerpoint/2015/main" val="1"/>
+              </p:ext>
+            </p:extLst>
+          </p:nvPr>
+        </p:nvSpPr>
+        <p:spPr>
+          <a:xfrm>
+            <a:off x="3740383" y="0"/>
+            <a:ext cx="8451607" cy="6858001"/>
+          </a:xfrm>
+          <a:prstGeom prst="rect">
+            <a:avLst/>
+          </a:prstGeom>
+          <a:solidFill>
+            <a:schemeClr val="bg1">
+              <a:lumMod val="95000"/>
+            </a:schemeClr>
+          </a:solidFill>
+          <a:ln>
+            <a:noFill/>
+          </a:ln>
+        </p:spPr>
+        <p:style>
+          <a:lnRef idx="2">
+            <a:schemeClr val="accent1">
+              <a:shade val="50000"/>
+            </a:schemeClr>
+          </a:lnRef>
+          <a:fillRef idx="1">
+            <a:schemeClr val="accent1"/>
+          </a:fillRef>
+          <a:effectRef idx="0">
+            <a:schemeClr val="accent1"/>
+          </a:effectRef>
+          <a:fontRef idx="minor">
+            <a:schemeClr val="lt1"/>
+          </a:fontRef>
+        </p:style>
+        <p:txBody>
+          <a:bodyPr rtlCol="0" anchor="ctr"/>
+          <a:lstStyle/>
+          <a:p>
+            <a:pPr marL="0" marR="0" lvl="0" indent="0" algn="ctr" defTabSz="914400" rtl="0" eaLnBrk="1" fontAlgn="auto" latinLnBrk="0" hangingPunct="1">
+              <a:lnSpc>
+                <a:spcPct val="100000"/>
+              </a:lnSpc>
+              <a:spcBef>
+                <a:spcPts val="0"/>
+              </a:spcBef>
+              <a:spcAft>
+                <a:spcPts val="0"/>
+              </a:spcAft>
+              <a:buClrTx/>
+              <a:buSzTx/>
+              <a:buFontTx/>
+              <a:buNone/>
+              <a:tabLst/>
+              <a:defRPr/>
+            </a:pPr>
+            <a:endParaRPr kumimoji="0" lang="en-US" sz="1800" b="0" i="0" u="none" strike="noStrike" kern="1200" cap="none" spc="0" normalizeH="0" baseline="0" noProof="0">
+              <a:ln>
+                <a:noFill/>
+              </a:ln>
+              <a:solidFill>
+                <a:prstClr val="white"/>
+              </a:solidFill>
+              <a:effectLst/>
+              <a:uLnTx/>
+              <a:uFillTx/>
+              <a:latin typeface="等线" panose="020F0502020204030204"/>
+              <a:ea typeface="+mn-ea"/>
+              <a:cs typeface="+mn-cs"/>
+            </a:endParaRPr>
+          </a:p>
+        </p:txBody>
+      </p:sp>
+      <p:sp>
+        <p:nvSpPr>
+          <p:cNvPr id="10" name="Rectangle 9">
+            <a:extLst>
+              <a:ext uri="{FF2B5EF4-FFF2-40B4-BE49-F238E27FC236}">
+                <a16:creationId xmlns:a16="http://schemas.microsoft.com/office/drawing/2014/main" id="{C3896A03-3945-419A-B66B-4EE266EDD152}"/>
+              </a:ext>
+              <a:ext uri="{C183D7F6-B498-43B3-948B-1728B52AA6E4}">
+                <adec:decorative xmlns:adec="http://schemas.microsoft.com/office/drawing/2017/decorative" val="1"/>
+              </a:ext>
+            </a:extLst>
+          </p:cNvPr>
+          <p:cNvSpPr>
+            <a:spLocks noGrp="1" noRot="1" noChangeAspect="1" noMove="1" noResize="1" noEditPoints="1" noAdjustHandles="1" noChangeArrowheads="1" noChangeShapeType="1" noTextEdit="1"/>
+          </p:cNvSpPr>
+          <p:nvPr>
+            <p:extLst>
+              <p:ext uri="{386F3935-93C4-4BCD-93E2-E3B085C9AB24}">
+                <p16:designElem xmlns:p16="http://schemas.microsoft.com/office/powerpoint/2015/main" val="1"/>
+              </p:ext>
+            </p:extLst>
+          </p:nvPr>
+        </p:nvSpPr>
+        <p:spPr>
+          <a:xfrm>
+            <a:off x="10" y="0"/>
+            <a:ext cx="3745177" cy="6858001"/>
+          </a:xfrm>
+          <a:prstGeom prst="rect">
+            <a:avLst/>
+          </a:prstGeom>
+          <a:solidFill>
+            <a:schemeClr val="tx1">
+              <a:lumMod val="85000"/>
+              <a:lumOff val="15000"/>
+            </a:schemeClr>
+          </a:solidFill>
+          <a:ln>
+            <a:noFill/>
+          </a:ln>
+        </p:spPr>
+        <p:style>
+          <a:lnRef idx="2">
+            <a:schemeClr val="accent1">
+              <a:shade val="50000"/>
+            </a:schemeClr>
+          </a:lnRef>
+          <a:fillRef idx="1">
+            <a:schemeClr val="accent1"/>
+          </a:fillRef>
+          <a:effectRef idx="0">
+            <a:schemeClr val="accent1"/>
+          </a:effectRef>
+          <a:fontRef idx="minor">
+            <a:schemeClr val="lt1"/>
+          </a:fontRef>
+        </p:style>
+        <p:txBody>
+          <a:bodyPr rtlCol="0" anchor="ctr"/>
+          <a:lstStyle/>
+          <a:p>
+            <a:pPr marL="0" marR="0" lvl="0" indent="0" algn="ctr" defTabSz="914400" rtl="0" eaLnBrk="1" fontAlgn="auto" latinLnBrk="0" hangingPunct="1">
+              <a:lnSpc>
+                <a:spcPct val="100000"/>
+              </a:lnSpc>
+              <a:spcBef>
+                <a:spcPts val="0"/>
+              </a:spcBef>
+              <a:spcAft>
+                <a:spcPts val="0"/>
+              </a:spcAft>
+              <a:buClrTx/>
+              <a:buSzTx/>
+              <a:buFontTx/>
+              <a:buNone/>
+              <a:tabLst/>
+              <a:defRPr/>
+            </a:pPr>
+            <a:endParaRPr kumimoji="0" lang="en-US" sz="1800" b="0" i="0" u="none" strike="noStrike" kern="1200" cap="none" spc="0" normalizeH="0" baseline="0" noProof="0">
+              <a:ln>
+                <a:noFill/>
+              </a:ln>
+              <a:solidFill>
+                <a:prstClr val="white"/>
+              </a:solidFill>
+              <a:effectLst/>
+              <a:uLnTx/>
+              <a:uFillTx/>
+              <a:latin typeface="等线" panose="020F0502020204030204"/>
+              <a:ea typeface="+mn-ea"/>
+              <a:cs typeface="+mn-cs"/>
+            </a:endParaRPr>
+          </a:p>
+        </p:txBody>
+      </p:sp>
+      <p:sp>
+        <p:nvSpPr>
+          <p:cNvPr id="2" name="标题 1">
+            <a:extLst>
+              <a:ext uri="{FF2B5EF4-FFF2-40B4-BE49-F238E27FC236}">
+                <a16:creationId xmlns:a16="http://schemas.microsoft.com/office/drawing/2014/main" id="{F1E589C4-C84B-CA7D-ADFC-F8778A7FE32B}"/>
+              </a:ext>
+            </a:extLst>
+          </p:cNvPr>
+          <p:cNvSpPr>
+            <a:spLocks noGrp="1"/>
+          </p:cNvSpPr>
+          <p:nvPr>
+            <p:ph type="title"/>
+          </p:nvPr>
+        </p:nvSpPr>
+        <p:spPr>
+          <a:xfrm>
+            <a:off x="391886" y="637762"/>
+            <a:ext cx="2955748" cy="5576770"/>
+          </a:xfrm>
+        </p:spPr>
+        <p:txBody>
+          <a:bodyPr anchor="t">
+            <a:normAutofit/>
+          </a:bodyPr>
+          <a:lstStyle/>
+          <a:p>
+            <a:pPr algn="ctr"/>
+            <a:r>
+              <a:rPr lang="en-US" altLang="zh-CN" sz="3600" dirty="0">
+                <a:solidFill>
+                  <a:schemeClr val="bg1"/>
+                </a:solidFill>
+                <a:latin typeface="Times New Roman" panose="02020603050405020304" pitchFamily="18" charset="0"/>
+                <a:cs typeface="Times New Roman" panose="02020603050405020304" pitchFamily="18" charset="0"/>
+              </a:rPr>
+              <a:t>CNN</a:t>
+            </a:r>
+            <a:endParaRPr lang="zh-CN" altLang="en-US" sz="3600" dirty="0">
+              <a:solidFill>
+                <a:schemeClr val="bg1"/>
+              </a:solidFill>
+              <a:latin typeface="Times New Roman" panose="02020603050405020304" pitchFamily="18" charset="0"/>
+              <a:cs typeface="Times New Roman" panose="02020603050405020304" pitchFamily="18" charset="0"/>
+            </a:endParaRPr>
+          </a:p>
+        </p:txBody>
+      </p:sp>
+      <p:sp>
+        <p:nvSpPr>
+          <p:cNvPr id="12" name="Rectangle 11">
+            <a:extLst>
+              <a:ext uri="{FF2B5EF4-FFF2-40B4-BE49-F238E27FC236}">
+                <a16:creationId xmlns:a16="http://schemas.microsoft.com/office/drawing/2014/main" id="{B8EAE243-3A9F-4A46-B0D9-04C723A8A1BD}"/>
+              </a:ext>
+              <a:ext uri="{C183D7F6-B498-43B3-948B-1728B52AA6E4}">
+                <adec:decorative xmlns:adec="http://schemas.microsoft.com/office/drawing/2017/decorative" val="1"/>
+              </a:ext>
+            </a:extLst>
+          </p:cNvPr>
+          <p:cNvSpPr>
+            <a:spLocks noGrp="1" noRot="1" noChangeAspect="1" noMove="1" noResize="1" noEditPoints="1" noAdjustHandles="1" noChangeArrowheads="1" noChangeShapeType="1" noTextEdit="1"/>
+          </p:cNvSpPr>
+          <p:nvPr>
+            <p:extLst>
+              <p:ext uri="{386F3935-93C4-4BCD-93E2-E3B085C9AB24}">
+                <p16:designElem xmlns:p16="http://schemas.microsoft.com/office/powerpoint/2015/main" val="1"/>
+              </p:ext>
+            </p:extLst>
+          </p:nvPr>
+        </p:nvSpPr>
+        <p:spPr>
+          <a:xfrm>
+            <a:off x="4654733" y="643465"/>
+            <a:ext cx="457200" cy="45720"/>
+          </a:xfrm>
+          <a:prstGeom prst="rect">
+            <a:avLst/>
+          </a:prstGeom>
+          <a:solidFill>
+            <a:schemeClr val="tx1"/>
+          </a:solidFill>
+          <a:ln>
+            <a:noFill/>
+          </a:ln>
+        </p:spPr>
+        <p:style>
+          <a:lnRef idx="2">
+            <a:schemeClr val="accent1">
+              <a:shade val="50000"/>
+            </a:schemeClr>
+          </a:lnRef>
+          <a:fillRef idx="1">
+            <a:schemeClr val="accent1"/>
+          </a:fillRef>
+          <a:effectRef idx="0">
+            <a:schemeClr val="accent1"/>
+          </a:effectRef>
+          <a:fontRef idx="minor">
+            <a:schemeClr val="lt1"/>
+          </a:fontRef>
+        </p:style>
+        <p:txBody>
+          <a:bodyPr rtlCol="0" anchor="ctr"/>
+          <a:lstStyle/>
+          <a:p>
+            <a:pPr marL="0" marR="0" lvl="0" indent="0" algn="ctr" defTabSz="914400" rtl="0" eaLnBrk="1" fontAlgn="auto" latinLnBrk="0" hangingPunct="1">
+              <a:lnSpc>
+                <a:spcPct val="100000"/>
+              </a:lnSpc>
+              <a:spcBef>
+                <a:spcPts val="0"/>
+              </a:spcBef>
+              <a:spcAft>
+                <a:spcPts val="0"/>
+              </a:spcAft>
+              <a:buClrTx/>
+              <a:buSzTx/>
+              <a:buFontTx/>
+              <a:buNone/>
+              <a:tabLst/>
+              <a:defRPr/>
+            </a:pPr>
+            <a:endParaRPr kumimoji="0" lang="en-US" sz="1800" b="0" i="0" u="none" strike="noStrike" kern="1200" cap="none" spc="0" normalizeH="0" baseline="0" noProof="0">
+              <a:ln>
+                <a:noFill/>
+              </a:ln>
+              <a:solidFill>
+                <a:prstClr val="white"/>
+              </a:solidFill>
+              <a:effectLst/>
+              <a:uLnTx/>
+              <a:uFillTx/>
+              <a:latin typeface="等线" panose="020F0502020204030204"/>
+              <a:ea typeface="+mn-ea"/>
+              <a:cs typeface="+mn-cs"/>
+            </a:endParaRPr>
+          </a:p>
+        </p:txBody>
+      </p:sp>
+      <p:pic>
+        <p:nvPicPr>
+          <p:cNvPr id="5" name="内容占位符 4">
+            <a:extLst>
+              <a:ext uri="{FF2B5EF4-FFF2-40B4-BE49-F238E27FC236}">
+                <a16:creationId xmlns:a16="http://schemas.microsoft.com/office/drawing/2014/main" id="{247BF9CB-9054-7E09-7A26-2F92F1C1A47D}"/>
+              </a:ext>
+            </a:extLst>
+          </p:cNvPr>
+          <p:cNvPicPr>
+            <a:picLocks noGrp="1" noChangeAspect="1"/>
+          </p:cNvPicPr>
+          <p:nvPr>
+            <p:ph idx="1"/>
+          </p:nvPr>
+        </p:nvPicPr>
+        <p:blipFill>
+          <a:blip r:embed="rId2">
+            <a:extLst>
+              <a:ext uri="{28A0092B-C50C-407E-A947-70E740481C1C}">
+                <a14:useLocalDpi xmlns:a14="http://schemas.microsoft.com/office/drawing/2010/main" val="0"/>
+              </a:ext>
+            </a:extLst>
+          </a:blip>
+          <a:stretch>
+            <a:fillRect/>
+          </a:stretch>
+        </p:blipFill>
+        <p:spPr>
+          <a:xfrm>
+            <a:off x="4654550" y="1292441"/>
+            <a:ext cx="6391275" cy="4441394"/>
+          </a:xfrm>
+        </p:spPr>
+      </p:pic>
+    </p:spTree>
+    <p:extLst>
+      <p:ext uri="{BB962C8B-B14F-4D97-AF65-F5344CB8AC3E}">
+        <p14:creationId xmlns:p14="http://schemas.microsoft.com/office/powerpoint/2010/main" val="3694221611"/>
+      </p:ext>
+    </p:extLst>
+  </p:cSld>
+  <p:clrMapOvr>
+    <a:masterClrMapping/>
+  </p:clrMapOvr>
+</p:sld>
+</file>
+
+<file path=ppt/slides/slide8.xml><?xml version="1.0" encoding="utf-8"?>
+<p:sld xmlns:a="http://schemas.openxmlformats.org/drawingml/2006/main" xmlns:r="http://schemas.openxmlformats.org/officeDocument/2006/relationships" xmlns:p="http://schemas.openxmlformats.org/presentationml/2006/main">
+  <p:cSld>
+    <p:spTree>
+      <p:nvGrpSpPr>
+        <p:cNvPr id="1" name=""/>
+        <p:cNvGrpSpPr/>
+        <p:nvPr/>
+      </p:nvGrpSpPr>
+      <p:grpSpPr>
+        <a:xfrm>
+          <a:off x="0" y="0"/>
+          <a:ext cx="0" cy="0"/>
+          <a:chOff x="0" y="0"/>
+          <a:chExt cx="0" cy="0"/>
+        </a:xfrm>
+      </p:grpSpPr>
+      <p:sp>
+        <p:nvSpPr>
           <p:cNvPr id="2" name="标题 1">
             <a:extLst>
               <a:ext uri="{FF2B5EF4-FFF2-40B4-BE49-F238E27FC236}">
@@ -5597,7 +6001,14 @@
           <a:bodyPr/>
           <a:lstStyle/>
           <a:p>
-            <a:endParaRPr lang="zh-CN" altLang="en-US" dirty="0"/>
+            <a:r>
+              <a:rPr lang="en-US" altLang="zh-CN" dirty="0"/>
+              <a:t>Accuracy</a:t>
+            </a:r>
+            <a:r>
+              <a:rPr lang="zh-CN" altLang="en-US" dirty="0"/>
+              <a:t>怎么算（保留）</a:t>
+            </a:r>
           </a:p>
         </p:txBody>
       </p:sp>

</xml_diff>